<commit_message>
SMALL FIX : change background, highlight fragmentation part
</commit_message>
<xml_diff>
--- a/figs/figures.pptx
+++ b/figs/figures.pptx
@@ -8,8 +8,9 @@
     <p:sldId id="256" r:id="rId2"/>
     <p:sldId id="257" r:id="rId3"/>
     <p:sldId id="258" r:id="rId4"/>
-    <p:sldId id="259" r:id="rId5"/>
-    <p:sldId id="260" r:id="rId6"/>
+    <p:sldId id="261" r:id="rId5"/>
+    <p:sldId id="259" r:id="rId6"/>
+    <p:sldId id="260" r:id="rId7"/>
   </p:sldIdLst>
   <p:sldSz cx="12192000" cy="6858000"/>
   <p:notesSz cx="6858000" cy="9144000"/>
@@ -108,6 +109,11 @@
       </a:defRPr>
     </a:lvl9pPr>
   </p:defaultTextStyle>
+  <p:extLst>
+    <p:ext uri="{EFAFB233-063F-42B5-8137-9DF3F51BA10A}">
+      <p15:sldGuideLst xmlns:p15="http://schemas.microsoft.com/office/powerpoint/2012/main"/>
+    </p:ext>
+  </p:extLst>
 </p:presentation>
 </file>
 
@@ -258,7 +264,7 @@
           <a:p>
             <a:fld id="{9E1BDA83-470D-4D8E-BBDA-B06A4D4D0DF1}" type="datetimeFigureOut">
               <a:rPr lang="ko-KR" altLang="en-US" smtClean="0"/>
-              <a:t>2025-02-18</a:t>
+              <a:t>2025-03-17</a:t>
             </a:fld>
             <a:endParaRPr lang="ko-KR" altLang="en-US"/>
           </a:p>
@@ -456,7 +462,7 @@
           <a:p>
             <a:fld id="{9E1BDA83-470D-4D8E-BBDA-B06A4D4D0DF1}" type="datetimeFigureOut">
               <a:rPr lang="ko-KR" altLang="en-US" smtClean="0"/>
-              <a:t>2025-02-18</a:t>
+              <a:t>2025-03-17</a:t>
             </a:fld>
             <a:endParaRPr lang="ko-KR" altLang="en-US"/>
           </a:p>
@@ -664,7 +670,7 @@
           <a:p>
             <a:fld id="{9E1BDA83-470D-4D8E-BBDA-B06A4D4D0DF1}" type="datetimeFigureOut">
               <a:rPr lang="ko-KR" altLang="en-US" smtClean="0"/>
-              <a:t>2025-02-18</a:t>
+              <a:t>2025-03-17</a:t>
             </a:fld>
             <a:endParaRPr lang="ko-KR" altLang="en-US"/>
           </a:p>
@@ -862,7 +868,7 @@
           <a:p>
             <a:fld id="{9E1BDA83-470D-4D8E-BBDA-B06A4D4D0DF1}" type="datetimeFigureOut">
               <a:rPr lang="ko-KR" altLang="en-US" smtClean="0"/>
-              <a:t>2025-02-18</a:t>
+              <a:t>2025-03-17</a:t>
             </a:fld>
             <a:endParaRPr lang="ko-KR" altLang="en-US"/>
           </a:p>
@@ -1137,7 +1143,7 @@
           <a:p>
             <a:fld id="{9E1BDA83-470D-4D8E-BBDA-B06A4D4D0DF1}" type="datetimeFigureOut">
               <a:rPr lang="ko-KR" altLang="en-US" smtClean="0"/>
-              <a:t>2025-02-18</a:t>
+              <a:t>2025-03-17</a:t>
             </a:fld>
             <a:endParaRPr lang="ko-KR" altLang="en-US"/>
           </a:p>
@@ -1402,7 +1408,7 @@
           <a:p>
             <a:fld id="{9E1BDA83-470D-4D8E-BBDA-B06A4D4D0DF1}" type="datetimeFigureOut">
               <a:rPr lang="ko-KR" altLang="en-US" smtClean="0"/>
-              <a:t>2025-02-18</a:t>
+              <a:t>2025-03-17</a:t>
             </a:fld>
             <a:endParaRPr lang="ko-KR" altLang="en-US"/>
           </a:p>
@@ -1814,7 +1820,7 @@
           <a:p>
             <a:fld id="{9E1BDA83-470D-4D8E-BBDA-B06A4D4D0DF1}" type="datetimeFigureOut">
               <a:rPr lang="ko-KR" altLang="en-US" smtClean="0"/>
-              <a:t>2025-02-18</a:t>
+              <a:t>2025-03-17</a:t>
             </a:fld>
             <a:endParaRPr lang="ko-KR" altLang="en-US"/>
           </a:p>
@@ -1955,7 +1961,7 @@
           <a:p>
             <a:fld id="{9E1BDA83-470D-4D8E-BBDA-B06A4D4D0DF1}" type="datetimeFigureOut">
               <a:rPr lang="ko-KR" altLang="en-US" smtClean="0"/>
-              <a:t>2025-02-18</a:t>
+              <a:t>2025-03-17</a:t>
             </a:fld>
             <a:endParaRPr lang="ko-KR" altLang="en-US"/>
           </a:p>
@@ -2068,7 +2074,7 @@
           <a:p>
             <a:fld id="{9E1BDA83-470D-4D8E-BBDA-B06A4D4D0DF1}" type="datetimeFigureOut">
               <a:rPr lang="ko-KR" altLang="en-US" smtClean="0"/>
-              <a:t>2025-02-18</a:t>
+              <a:t>2025-03-17</a:t>
             </a:fld>
             <a:endParaRPr lang="ko-KR" altLang="en-US"/>
           </a:p>
@@ -2379,7 +2385,7 @@
           <a:p>
             <a:fld id="{9E1BDA83-470D-4D8E-BBDA-B06A4D4D0DF1}" type="datetimeFigureOut">
               <a:rPr lang="ko-KR" altLang="en-US" smtClean="0"/>
-              <a:t>2025-02-18</a:t>
+              <a:t>2025-03-17</a:t>
             </a:fld>
             <a:endParaRPr lang="ko-KR" altLang="en-US"/>
           </a:p>
@@ -2667,7 +2673,7 @@
           <a:p>
             <a:fld id="{9E1BDA83-470D-4D8E-BBDA-B06A4D4D0DF1}" type="datetimeFigureOut">
               <a:rPr lang="ko-KR" altLang="en-US" smtClean="0"/>
-              <a:t>2025-02-18</a:t>
+              <a:t>2025-03-17</a:t>
             </a:fld>
             <a:endParaRPr lang="ko-KR" altLang="en-US"/>
           </a:p>
@@ -2908,7 +2914,7 @@
           <a:p>
             <a:fld id="{9E1BDA83-470D-4D8E-BBDA-B06A4D4D0DF1}" type="datetimeFigureOut">
               <a:rPr lang="ko-KR" altLang="en-US" smtClean="0"/>
-              <a:t>2025-02-18</a:t>
+              <a:t>2025-03-17</a:t>
             </a:fld>
             <a:endParaRPr lang="ko-KR" altLang="en-US"/>
           </a:p>
@@ -3471,10 +3477,10 @@
       </p:grpSpPr>
       <p:pic>
         <p:nvPicPr>
-          <p:cNvPr id="3" name="그림 2" descr="텍스트, 도표, 스크린샷, 평면도이(가) 표시된 사진&#10;&#10;AI가 생성한 콘텐츠는 부정확할 수 있습니다.">
-            <a:extLst>
-              <a:ext uri="{FF2B5EF4-FFF2-40B4-BE49-F238E27FC236}">
-                <a16:creationId xmlns:a16="http://schemas.microsoft.com/office/drawing/2014/main" id="{71BDB93E-7B91-D936-7A85-83F86E15F56A}"/>
+          <p:cNvPr id="4" name="그림 3" descr="텍스트, 스크린샷, 도표, 폰트이(가) 표시된 사진&#10;&#10;AI가 생성한 콘텐츠는 부정확할 수 있습니다.">
+            <a:extLst>
+              <a:ext uri="{FF2B5EF4-FFF2-40B4-BE49-F238E27FC236}">
+                <a16:creationId xmlns:a16="http://schemas.microsoft.com/office/drawing/2014/main" id="{3D874B01-7734-A926-3FE6-23174266ACE2}"/>
               </a:ext>
             </a:extLst>
           </p:cNvPr>
@@ -3497,8 +3503,8 @@
         </p:blipFill>
         <p:spPr>
           <a:xfrm>
-            <a:off x="259080" y="1309944"/>
-            <a:ext cx="11673840" cy="4238111"/>
+            <a:off x="2249003" y="471167"/>
+            <a:ext cx="7693994" cy="5915665"/>
           </a:xfrm>
           <a:prstGeom prst="rect">
             <a:avLst/>
@@ -3519,6 +3525,78 @@
 </file>
 
 <file path=ppt/slides/slide4.xml><?xml version="1.0" encoding="utf-8"?>
+<p:sld xmlns:a="http://schemas.openxmlformats.org/drawingml/2006/main" xmlns:r="http://schemas.openxmlformats.org/officeDocument/2006/relationships" xmlns:p="http://schemas.openxmlformats.org/presentationml/2006/main">
+  <p:cSld>
+    <p:spTree>
+      <p:nvGrpSpPr>
+        <p:cNvPr id="1" name="">
+          <a:extLst>
+            <a:ext uri="{FF2B5EF4-FFF2-40B4-BE49-F238E27FC236}">
+              <a16:creationId xmlns:a16="http://schemas.microsoft.com/office/drawing/2014/main" id="{CF2413C3-20CE-BEE8-BB80-31BA560000E9}"/>
+            </a:ext>
+          </a:extLst>
+        </p:cNvPr>
+        <p:cNvGrpSpPr/>
+        <p:nvPr/>
+      </p:nvGrpSpPr>
+      <p:grpSpPr>
+        <a:xfrm>
+          <a:off x="0" y="0"/>
+          <a:ext cx="0" cy="0"/>
+          <a:chOff x="0" y="0"/>
+          <a:chExt cx="0" cy="0"/>
+        </a:xfrm>
+      </p:grpSpPr>
+      <p:pic>
+        <p:nvPicPr>
+          <p:cNvPr id="4" name="그림 3" descr="텍스트, 스크린샷, 도표, 번호이(가) 표시된 사진&#10;&#10;AI가 생성한 콘텐츠는 부정확할 수 있습니다.">
+            <a:extLst>
+              <a:ext uri="{FF2B5EF4-FFF2-40B4-BE49-F238E27FC236}">
+                <a16:creationId xmlns:a16="http://schemas.microsoft.com/office/drawing/2014/main" id="{3EE2AB2D-4DFC-A9EC-EFBB-397CD50805D1}"/>
+              </a:ext>
+            </a:extLst>
+          </p:cNvPr>
+          <p:cNvPicPr>
+            <a:picLocks noChangeAspect="1"/>
+          </p:cNvPicPr>
+          <p:nvPr/>
+        </p:nvPicPr>
+        <p:blipFill>
+          <a:blip r:embed="rId2">
+            <a:extLst>
+              <a:ext uri="{28A0092B-C50C-407E-A947-70E740481C1C}">
+                <a14:useLocalDpi xmlns:a14="http://schemas.microsoft.com/office/drawing/2010/main" val="0"/>
+              </a:ext>
+            </a:extLst>
+          </a:blip>
+          <a:stretch>
+            <a:fillRect/>
+          </a:stretch>
+        </p:blipFill>
+        <p:spPr>
+          <a:xfrm>
+            <a:off x="1747398" y="539739"/>
+            <a:ext cx="8697204" cy="5778521"/>
+          </a:xfrm>
+          <a:prstGeom prst="rect">
+            <a:avLst/>
+          </a:prstGeom>
+        </p:spPr>
+      </p:pic>
+    </p:spTree>
+    <p:extLst>
+      <p:ext uri="{BB962C8B-B14F-4D97-AF65-F5344CB8AC3E}">
+        <p14:creationId xmlns:p14="http://schemas.microsoft.com/office/powerpoint/2010/main" val="3843879719"/>
+      </p:ext>
+    </p:extLst>
+  </p:cSld>
+  <p:clrMapOvr>
+    <a:masterClrMapping/>
+  </p:clrMapOvr>
+</p:sld>
+</file>
+
+<file path=ppt/slides/slide5.xml><?xml version="1.0" encoding="utf-8"?>
 <p:sld xmlns:a="http://schemas.openxmlformats.org/drawingml/2006/main" xmlns:r="http://schemas.openxmlformats.org/officeDocument/2006/relationships" xmlns:p="http://schemas.openxmlformats.org/presentationml/2006/main">
   <p:cSld>
     <p:spTree>
@@ -3590,7 +3668,7 @@
 </p:sld>
 </file>
 
-<file path=ppt/slides/slide5.xml><?xml version="1.0" encoding="utf-8"?>
+<file path=ppt/slides/slide6.xml><?xml version="1.0" encoding="utf-8"?>
 <p:sld xmlns:a="http://schemas.openxmlformats.org/drawingml/2006/main" xmlns:r="http://schemas.openxmlformats.org/officeDocument/2006/relationships" xmlns:p="http://schemas.openxmlformats.org/presentationml/2006/main">
   <p:cSld>
     <p:spTree>

</xml_diff>

<commit_message>
change origin graphs data directory
</commit_message>
<xml_diff>
--- a/figs/figures.pptx
+++ b/figs/figures.pptx
@@ -264,7 +264,7 @@
           <a:p>
             <a:fld id="{9E1BDA83-470D-4D8E-BBDA-B06A4D4D0DF1}" type="datetimeFigureOut">
               <a:rPr lang="ko-KR" altLang="en-US" smtClean="0"/>
-              <a:t>2025-03-17</a:t>
+              <a:t>2025. 4. 1.</a:t>
             </a:fld>
             <a:endParaRPr lang="ko-KR" altLang="en-US"/>
           </a:p>
@@ -462,7 +462,7 @@
           <a:p>
             <a:fld id="{9E1BDA83-470D-4D8E-BBDA-B06A4D4D0DF1}" type="datetimeFigureOut">
               <a:rPr lang="ko-KR" altLang="en-US" smtClean="0"/>
-              <a:t>2025-03-17</a:t>
+              <a:t>2025. 4. 1.</a:t>
             </a:fld>
             <a:endParaRPr lang="ko-KR" altLang="en-US"/>
           </a:p>
@@ -670,7 +670,7 @@
           <a:p>
             <a:fld id="{9E1BDA83-470D-4D8E-BBDA-B06A4D4D0DF1}" type="datetimeFigureOut">
               <a:rPr lang="ko-KR" altLang="en-US" smtClean="0"/>
-              <a:t>2025-03-17</a:t>
+              <a:t>2025. 4. 1.</a:t>
             </a:fld>
             <a:endParaRPr lang="ko-KR" altLang="en-US"/>
           </a:p>
@@ -868,7 +868,7 @@
           <a:p>
             <a:fld id="{9E1BDA83-470D-4D8E-BBDA-B06A4D4D0DF1}" type="datetimeFigureOut">
               <a:rPr lang="ko-KR" altLang="en-US" smtClean="0"/>
-              <a:t>2025-03-17</a:t>
+              <a:t>2025. 4. 1.</a:t>
             </a:fld>
             <a:endParaRPr lang="ko-KR" altLang="en-US"/>
           </a:p>
@@ -1143,7 +1143,7 @@
           <a:p>
             <a:fld id="{9E1BDA83-470D-4D8E-BBDA-B06A4D4D0DF1}" type="datetimeFigureOut">
               <a:rPr lang="ko-KR" altLang="en-US" smtClean="0"/>
-              <a:t>2025-03-17</a:t>
+              <a:t>2025. 4. 1.</a:t>
             </a:fld>
             <a:endParaRPr lang="ko-KR" altLang="en-US"/>
           </a:p>
@@ -1408,7 +1408,7 @@
           <a:p>
             <a:fld id="{9E1BDA83-470D-4D8E-BBDA-B06A4D4D0DF1}" type="datetimeFigureOut">
               <a:rPr lang="ko-KR" altLang="en-US" smtClean="0"/>
-              <a:t>2025-03-17</a:t>
+              <a:t>2025. 4. 1.</a:t>
             </a:fld>
             <a:endParaRPr lang="ko-KR" altLang="en-US"/>
           </a:p>
@@ -1820,7 +1820,7 @@
           <a:p>
             <a:fld id="{9E1BDA83-470D-4D8E-BBDA-B06A4D4D0DF1}" type="datetimeFigureOut">
               <a:rPr lang="ko-KR" altLang="en-US" smtClean="0"/>
-              <a:t>2025-03-17</a:t>
+              <a:t>2025. 4. 1.</a:t>
             </a:fld>
             <a:endParaRPr lang="ko-KR" altLang="en-US"/>
           </a:p>
@@ -1961,7 +1961,7 @@
           <a:p>
             <a:fld id="{9E1BDA83-470D-4D8E-BBDA-B06A4D4D0DF1}" type="datetimeFigureOut">
               <a:rPr lang="ko-KR" altLang="en-US" smtClean="0"/>
-              <a:t>2025-03-17</a:t>
+              <a:t>2025. 4. 1.</a:t>
             </a:fld>
             <a:endParaRPr lang="ko-KR" altLang="en-US"/>
           </a:p>
@@ -2074,7 +2074,7 @@
           <a:p>
             <a:fld id="{9E1BDA83-470D-4D8E-BBDA-B06A4D4D0DF1}" type="datetimeFigureOut">
               <a:rPr lang="ko-KR" altLang="en-US" smtClean="0"/>
-              <a:t>2025-03-17</a:t>
+              <a:t>2025. 4. 1.</a:t>
             </a:fld>
             <a:endParaRPr lang="ko-KR" altLang="en-US"/>
           </a:p>
@@ -2385,7 +2385,7 @@
           <a:p>
             <a:fld id="{9E1BDA83-470D-4D8E-BBDA-B06A4D4D0DF1}" type="datetimeFigureOut">
               <a:rPr lang="ko-KR" altLang="en-US" smtClean="0"/>
-              <a:t>2025-03-17</a:t>
+              <a:t>2025. 4. 1.</a:t>
             </a:fld>
             <a:endParaRPr lang="ko-KR" altLang="en-US"/>
           </a:p>
@@ -2673,7 +2673,7 @@
           <a:p>
             <a:fld id="{9E1BDA83-470D-4D8E-BBDA-B06A4D4D0DF1}" type="datetimeFigureOut">
               <a:rPr lang="ko-KR" altLang="en-US" smtClean="0"/>
-              <a:t>2025-03-17</a:t>
+              <a:t>2025. 4. 1.</a:t>
             </a:fld>
             <a:endParaRPr lang="ko-KR" altLang="en-US"/>
           </a:p>
@@ -2914,7 +2914,7 @@
           <a:p>
             <a:fld id="{9E1BDA83-470D-4D8E-BBDA-B06A4D4D0DF1}" type="datetimeFigureOut">
               <a:rPr lang="ko-KR" altLang="en-US" smtClean="0"/>
-              <a:t>2025-03-17</a:t>
+              <a:t>2025. 4. 1.</a:t>
             </a:fld>
             <a:endParaRPr lang="ko-KR" altLang="en-US"/>
           </a:p>
@@ -3333,10 +3333,10 @@
       </p:grpSpPr>
       <p:pic>
         <p:nvPicPr>
-          <p:cNvPr id="5" name="그림 4" descr="텍스트, 도표, 스크린샷, 직사각형이(가) 표시된 사진&#10;&#10;AI가 생성한 콘텐츠는 부정확할 수 있습니다.">
-            <a:extLst>
-              <a:ext uri="{FF2B5EF4-FFF2-40B4-BE49-F238E27FC236}">
-                <a16:creationId xmlns:a16="http://schemas.microsoft.com/office/drawing/2014/main" id="{67F5E5E5-21CA-BF15-7C04-CC82C3B20A9F}"/>
+          <p:cNvPr id="3" name="그림 2" descr="텍스트, 도표, 스크린샷, 직사각형이(가) 표시된 사진&#10;&#10;AI가 생성한 콘텐츠는 부정확할 수 있습니다.">
+            <a:extLst>
+              <a:ext uri="{FF2B5EF4-FFF2-40B4-BE49-F238E27FC236}">
+                <a16:creationId xmlns:a16="http://schemas.microsoft.com/office/drawing/2014/main" id="{1A073BBF-169B-8997-DEB7-CE396179919B}"/>
               </a:ext>
             </a:extLst>
           </p:cNvPr>
@@ -3359,8 +3359,8 @@
         </p:blipFill>
         <p:spPr>
           <a:xfrm>
-            <a:off x="3121342" y="260191"/>
-            <a:ext cx="6337618" cy="6337618"/>
+            <a:off x="2981813" y="301562"/>
+            <a:ext cx="6228373" cy="6254876"/>
           </a:xfrm>
           <a:prstGeom prst="rect">
             <a:avLst/>

</xml_diff>